<commit_message>
Last minute and in lecture changes
</commit_message>
<xml_diff>
--- a/Slides/src/2015/Lecture03-Tutorial.pptx
+++ b/Slides/src/2015/Lecture03-Tutorial.pptx
@@ -216,7 +216,7 @@
           <a:p>
             <a:fld id="{0B7652A0-FEB4-AA41-A12B-ED809B2EC655}" type="datetimeFigureOut">
               <a:rPr lang="en-US" smtClean="0"/>
-              <a:t>30/03/15</a:t>
+              <a:t>31/03/15</a:t>
             </a:fld>
             <a:endParaRPr lang="en-US"/>
           </a:p>
@@ -382,7 +382,7 @@
           <a:p>
             <a:fld id="{AD460C2B-D677-904D-8293-1E3D2FE1164E}" type="datetimeFigureOut">
               <a:rPr lang="en-US" smtClean="0"/>
-              <a:t>30/03/15</a:t>
+              <a:t>31/03/15</a:t>
             </a:fld>
             <a:endParaRPr lang="en-US"/>
           </a:p>
@@ -5331,6 +5331,44 @@
           </a:p>
         </p:txBody>
       </p:sp>
+      <p:sp>
+        <p:nvSpPr>
+          <p:cNvPr id="4" name="TextBox 3"/>
+          <p:cNvSpPr txBox="1"/>
+          <p:nvPr/>
+        </p:nvSpPr>
+        <p:spPr>
+          <a:xfrm rot="2237244">
+            <a:off x="-171957" y="4868151"/>
+            <a:ext cx="3459826" cy="646331"/>
+          </a:xfrm>
+          <a:prstGeom prst="rect">
+            <a:avLst/>
+          </a:prstGeom>
+          <a:noFill/>
+        </p:spPr>
+        <p:txBody>
+          <a:bodyPr wrap="none" rtlCol="0">
+            <a:spAutoFit/>
+          </a:bodyPr>
+          <a:lstStyle/>
+          <a:p>
+            <a:r>
+              <a:rPr lang="en-US" sz="3600" b="1" dirty="0" smtClean="0">
+                <a:solidFill>
+                  <a:srgbClr val="FF0000"/>
+                </a:solidFill>
+              </a:rPr>
+              <a:t>Optional Tutorial</a:t>
+            </a:r>
+            <a:endParaRPr lang="en-US" sz="3600" b="1" dirty="0">
+              <a:solidFill>
+                <a:srgbClr val="FF0000"/>
+              </a:solidFill>
+            </a:endParaRPr>
+          </a:p>
+        </p:txBody>
+      </p:sp>
     </p:spTree>
     <p:extLst>
       <p:ext uri="{BB962C8B-B14F-4D97-AF65-F5344CB8AC3E}">
@@ -5548,6 +5586,13 @@
   <p:transition xmlns:p14="http://schemas.microsoft.com/office/powerpoint/2010/main">
     <p:fade/>
   </p:transition>
+  <p:timing>
+    <p:tnLst>
+      <p:par>
+        <p:cTn xmlns:p14="http://schemas.microsoft.com/office/powerpoint/2010/main" id="1" dur="indefinite" restart="never" nodeType="tmRoot"/>
+      </p:par>
+    </p:tnLst>
+  </p:timing>
 </p:sld>
 </file>
 
@@ -17818,6 +17863,44 @@
           </a:effectLst>
         </p:spPr>
       </p:pic>
+      <p:sp>
+        <p:nvSpPr>
+          <p:cNvPr id="7" name="TextBox 6"/>
+          <p:cNvSpPr txBox="1"/>
+          <p:nvPr/>
+        </p:nvSpPr>
+        <p:spPr>
+          <a:xfrm rot="2237244">
+            <a:off x="-171957" y="4868151"/>
+            <a:ext cx="3459826" cy="646331"/>
+          </a:xfrm>
+          <a:prstGeom prst="rect">
+            <a:avLst/>
+          </a:prstGeom>
+          <a:noFill/>
+        </p:spPr>
+        <p:txBody>
+          <a:bodyPr wrap="none" rtlCol="0">
+            <a:spAutoFit/>
+          </a:bodyPr>
+          <a:lstStyle/>
+          <a:p>
+            <a:r>
+              <a:rPr lang="en-US" sz="3600" b="1" dirty="0" smtClean="0">
+                <a:solidFill>
+                  <a:srgbClr val="FF0000"/>
+                </a:solidFill>
+              </a:rPr>
+              <a:t>Optional Tutorial</a:t>
+            </a:r>
+            <a:endParaRPr lang="en-US" sz="3600" b="1" dirty="0">
+              <a:solidFill>
+                <a:srgbClr val="FF0000"/>
+              </a:solidFill>
+            </a:endParaRPr>
+          </a:p>
+        </p:txBody>
+      </p:sp>
     </p:spTree>
     <p:extLst>
       <p:ext uri="{BB962C8B-B14F-4D97-AF65-F5344CB8AC3E}">
@@ -18751,11 +18834,7 @@
             </a:pPr>
             <a:r>
               <a:rPr lang="en-US" dirty="0" smtClean="0"/>
-              <a:t>Really, you don’t need </a:t>
-            </a:r>
-            <a:r>
-              <a:rPr lang="en-US" smtClean="0"/>
-              <a:t>anything else.</a:t>
+              <a:t>Really, you don’t need anything else.</a:t>
             </a:r>
             <a:endParaRPr lang="en-US" dirty="0"/>
           </a:p>
@@ -18845,6 +18924,13 @@
   <p:transition xmlns:p14="http://schemas.microsoft.com/office/powerpoint/2010/main">
     <p:fade/>
   </p:transition>
+  <p:timing>
+    <p:tnLst>
+      <p:par>
+        <p:cTn xmlns:p14="http://schemas.microsoft.com/office/powerpoint/2010/main" id="1" dur="indefinite" restart="never" nodeType="tmRoot"/>
+      </p:par>
+    </p:tnLst>
+  </p:timing>
 </p:sld>
 </file>
 
@@ -19501,7 +19587,11 @@
           <a:p>
             <a:r>
               <a:rPr lang="en-US" dirty="0" smtClean="0"/>
-              <a:t>Why is version control so important?</a:t>
+              <a:t>Why is version control so important</a:t>
+            </a:r>
+            <a:r>
+              <a:rPr lang="en-US" dirty="0" smtClean="0"/>
+              <a:t>?</a:t>
             </a:r>
           </a:p>
           <a:p>

</xml_diff>